<commit_message>
Added draft for presentation.
</commit_message>
<xml_diff>
--- a/Work-Job-Analysis.pptx
+++ b/Work-Job-Analysis.pptx
@@ -13,6 +13,7 @@
     <p:sldId id="261" r:id="rId7"/>
     <p:sldId id="262" r:id="rId8"/>
     <p:sldId id="263" r:id="rId9"/>
+    <p:sldId id="264" r:id="rId10"/>
   </p:sldIdLst>
   <p:sldSz cx="12192000" cy="6858000"/>
   <p:notesSz cx="6858000" cy="9144000"/>
@@ -3854,6 +3855,158 @@
           </a:xfrm>
         </p:spPr>
       </p:pic>
+      <p:sp>
+        <p:nvSpPr>
+          <p:cNvPr id="3" name="TextBox 2">
+            <a:extLst>
+              <a:ext uri="{FF2B5EF4-FFF2-40B4-BE49-F238E27FC236}">
+                <a16:creationId xmlns:a16="http://schemas.microsoft.com/office/drawing/2014/main" id="{6FF6B0E1-6A74-8D41-99AD-FA98E701CE78}"/>
+              </a:ext>
+            </a:extLst>
+          </p:cNvPr>
+          <p:cNvSpPr txBox="1"/>
+          <p:nvPr/>
+        </p:nvSpPr>
+        <p:spPr>
+          <a:xfrm>
+            <a:off x="9028253" y="1886673"/>
+            <a:ext cx="2037144" cy="369332"/>
+          </a:xfrm>
+          <a:prstGeom prst="rect">
+            <a:avLst/>
+          </a:prstGeom>
+          <a:noFill/>
+        </p:spPr>
+        <p:txBody>
+          <a:bodyPr wrap="square" rtlCol="0">
+            <a:spAutoFit/>
+          </a:bodyPr>
+          <a:lstStyle/>
+          <a:p>
+            <a:r>
+              <a:rPr lang="en-US" b="1" dirty="0"/>
+              <a:t>Global – Outer pie</a:t>
+            </a:r>
+          </a:p>
+        </p:txBody>
+      </p:sp>
+      <p:sp>
+        <p:nvSpPr>
+          <p:cNvPr id="5" name="TextBox 4">
+            <a:extLst>
+              <a:ext uri="{FF2B5EF4-FFF2-40B4-BE49-F238E27FC236}">
+                <a16:creationId xmlns:a16="http://schemas.microsoft.com/office/drawing/2014/main" id="{38CB4D11-7863-8D4D-992F-31D7DEA419E7}"/>
+              </a:ext>
+            </a:extLst>
+          </p:cNvPr>
+          <p:cNvSpPr txBox="1"/>
+          <p:nvPr/>
+        </p:nvSpPr>
+        <p:spPr>
+          <a:xfrm>
+            <a:off x="9028253" y="2447783"/>
+            <a:ext cx="1585731" cy="369332"/>
+          </a:xfrm>
+          <a:prstGeom prst="rect">
+            <a:avLst/>
+          </a:prstGeom>
+          <a:noFill/>
+        </p:spPr>
+        <p:txBody>
+          <a:bodyPr wrap="square" rtlCol="0">
+            <a:spAutoFit/>
+          </a:bodyPr>
+          <a:lstStyle/>
+          <a:p>
+            <a:r>
+              <a:rPr lang="en-US" b="1" dirty="0"/>
+              <a:t>US – Inner pie</a:t>
+            </a:r>
+          </a:p>
+        </p:txBody>
+      </p:sp>
+      <p:cxnSp>
+        <p:nvCxnSpPr>
+          <p:cNvPr id="6" name="Straight Arrow Connector 5">
+            <a:extLst>
+              <a:ext uri="{FF2B5EF4-FFF2-40B4-BE49-F238E27FC236}">
+                <a16:creationId xmlns:a16="http://schemas.microsoft.com/office/drawing/2014/main" id="{9C8869D4-E306-6845-B9F6-E0AEC4073EE9}"/>
+              </a:ext>
+            </a:extLst>
+          </p:cNvPr>
+          <p:cNvCxnSpPr>
+            <a:cxnSpLocks/>
+          </p:cNvCxnSpPr>
+          <p:nvPr/>
+        </p:nvCxnSpPr>
+        <p:spPr>
+          <a:xfrm flipV="1">
+            <a:off x="7158038" y="2071339"/>
+            <a:ext cx="1870215" cy="465222"/>
+          </a:xfrm>
+          <a:prstGeom prst="straightConnector1">
+            <a:avLst/>
+          </a:prstGeom>
+          <a:ln w="63500">
+            <a:tailEnd type="triangle"/>
+          </a:ln>
+        </p:spPr>
+        <p:style>
+          <a:lnRef idx="1">
+            <a:schemeClr val="accent1"/>
+          </a:lnRef>
+          <a:fillRef idx="0">
+            <a:schemeClr val="accent1"/>
+          </a:fillRef>
+          <a:effectRef idx="0">
+            <a:schemeClr val="accent1"/>
+          </a:effectRef>
+          <a:fontRef idx="minor">
+            <a:schemeClr val="tx1"/>
+          </a:fontRef>
+        </p:style>
+      </p:cxnSp>
+      <p:cxnSp>
+        <p:nvCxnSpPr>
+          <p:cNvPr id="8" name="Straight Arrow Connector 7">
+            <a:extLst>
+              <a:ext uri="{FF2B5EF4-FFF2-40B4-BE49-F238E27FC236}">
+                <a16:creationId xmlns:a16="http://schemas.microsoft.com/office/drawing/2014/main" id="{79F80F17-BC04-CD41-8745-6AF05889F308}"/>
+              </a:ext>
+            </a:extLst>
+          </p:cNvPr>
+          <p:cNvCxnSpPr>
+            <a:cxnSpLocks/>
+          </p:cNvCxnSpPr>
+          <p:nvPr/>
+        </p:nvCxnSpPr>
+        <p:spPr>
+          <a:xfrm flipV="1">
+            <a:off x="6372225" y="2632450"/>
+            <a:ext cx="2656028" cy="649887"/>
+          </a:xfrm>
+          <a:prstGeom prst="straightConnector1">
+            <a:avLst/>
+          </a:prstGeom>
+          <a:ln w="63500">
+            <a:tailEnd type="triangle"/>
+          </a:ln>
+        </p:spPr>
+        <p:style>
+          <a:lnRef idx="1">
+            <a:schemeClr val="accent1"/>
+          </a:lnRef>
+          <a:fillRef idx="0">
+            <a:schemeClr val="accent1"/>
+          </a:fillRef>
+          <a:effectRef idx="0">
+            <a:schemeClr val="accent1"/>
+          </a:effectRef>
+          <a:fontRef idx="minor">
+            <a:schemeClr val="tx1"/>
+          </a:fontRef>
+        </p:style>
+      </p:cxnSp>
     </p:spTree>
     <p:extLst>
       <p:ext uri="{BB962C8B-B14F-4D97-AF65-F5344CB8AC3E}">
@@ -4042,6 +4195,98 @@
     <p:extLst>
       <p:ext uri="{BB962C8B-B14F-4D97-AF65-F5344CB8AC3E}">
         <p14:creationId xmlns:p14="http://schemas.microsoft.com/office/powerpoint/2010/main" val="958598198"/>
+      </p:ext>
+    </p:extLst>
+  </p:cSld>
+  <p:clrMapOvr>
+    <a:masterClrMapping/>
+  </p:clrMapOvr>
+</p:sld>
+</file>
+
+<file path=ppt/slides/slide9.xml><?xml version="1.0" encoding="utf-8"?>
+<p:sld xmlns:a="http://schemas.openxmlformats.org/drawingml/2006/main" xmlns:r="http://schemas.openxmlformats.org/officeDocument/2006/relationships" xmlns:p="http://schemas.openxmlformats.org/presentationml/2006/main">
+  <p:cSld>
+    <p:spTree>
+      <p:nvGrpSpPr>
+        <p:cNvPr id="1" name=""/>
+        <p:cNvGrpSpPr/>
+        <p:nvPr/>
+      </p:nvGrpSpPr>
+      <p:grpSpPr>
+        <a:xfrm>
+          <a:off x="0" y="0"/>
+          <a:ext cx="0" cy="0"/>
+          <a:chOff x="0" y="0"/>
+          <a:chExt cx="0" cy="0"/>
+        </a:xfrm>
+      </p:grpSpPr>
+      <p:sp>
+        <p:nvSpPr>
+          <p:cNvPr id="2" name="Title 1">
+            <a:extLst>
+              <a:ext uri="{FF2B5EF4-FFF2-40B4-BE49-F238E27FC236}">
+                <a16:creationId xmlns:a16="http://schemas.microsoft.com/office/drawing/2014/main" id="{F31EED3A-EBDB-CD4C-AA9B-14EB7C9535E0}"/>
+              </a:ext>
+            </a:extLst>
+          </p:cNvPr>
+          <p:cNvSpPr>
+            <a:spLocks noGrp="1"/>
+          </p:cNvSpPr>
+          <p:nvPr>
+            <p:ph type="title"/>
+          </p:nvPr>
+        </p:nvSpPr>
+        <p:spPr>
+          <a:xfrm>
+            <a:off x="838200" y="0"/>
+            <a:ext cx="10515600" cy="1325563"/>
+          </a:xfrm>
+        </p:spPr>
+        <p:txBody>
+          <a:bodyPr/>
+          <a:lstStyle/>
+          <a:p>
+            <a:r>
+              <a:rPr lang="en-US" dirty="0"/>
+              <a:t>Professional Coding Experience</a:t>
+            </a:r>
+          </a:p>
+        </p:txBody>
+      </p:sp>
+      <p:pic>
+        <p:nvPicPr>
+          <p:cNvPr id="5" name="Content Placeholder 4">
+            <a:extLst>
+              <a:ext uri="{FF2B5EF4-FFF2-40B4-BE49-F238E27FC236}">
+                <a16:creationId xmlns:a16="http://schemas.microsoft.com/office/drawing/2014/main" id="{CFA5B03F-C00F-6748-96A3-0D8AC5160F24}"/>
+              </a:ext>
+            </a:extLst>
+          </p:cNvPr>
+          <p:cNvPicPr>
+            <a:picLocks noGrp="1" noChangeAspect="1"/>
+          </p:cNvPicPr>
+          <p:nvPr>
+            <p:ph idx="1"/>
+          </p:nvPr>
+        </p:nvPicPr>
+        <p:blipFill>
+          <a:blip r:embed="rId2"/>
+          <a:stretch>
+            <a:fillRect/>
+          </a:stretch>
+        </p:blipFill>
+        <p:spPr>
+          <a:xfrm>
+            <a:off x="838200" y="1325563"/>
+            <a:ext cx="10872482" cy="5132387"/>
+          </a:xfrm>
+        </p:spPr>
+      </p:pic>
+    </p:spTree>
+    <p:extLst>
+      <p:ext uri="{BB962C8B-B14F-4D97-AF65-F5344CB8AC3E}">
+        <p14:creationId xmlns:p14="http://schemas.microsoft.com/office/powerpoint/2010/main" val="3181006487"/>
       </p:ext>
     </p:extLst>
   </p:cSld>

</xml_diff>